<commit_message>
updated video and presentation
</commit_message>
<xml_diff>
--- a/Documents/Presentations/Second_presentation.pptx
+++ b/Documents/Presentations/Second_presentation.pptx
@@ -15,17 +15,21 @@
     <p:sldId id="260" r:id="rId9"/>
     <p:sldId id="263" r:id="rId10"/>
     <p:sldId id="274" r:id="rId11"/>
-    <p:sldId id="259" r:id="rId12"/>
-    <p:sldId id="264" r:id="rId13"/>
-    <p:sldId id="273" r:id="rId14"/>
-    <p:sldId id="271" r:id="rId15"/>
-    <p:sldId id="272" r:id="rId16"/>
-    <p:sldId id="266" r:id="rId17"/>
-    <p:sldId id="267" r:id="rId18"/>
-    <p:sldId id="268" r:id="rId19"/>
-    <p:sldId id="269" r:id="rId20"/>
-    <p:sldId id="270" r:id="rId21"/>
-    <p:sldId id="265" r:id="rId22"/>
+    <p:sldId id="273" r:id="rId12"/>
+    <p:sldId id="271" r:id="rId13"/>
+    <p:sldId id="272" r:id="rId14"/>
+    <p:sldId id="266" r:id="rId15"/>
+    <p:sldId id="267" r:id="rId16"/>
+    <p:sldId id="268" r:id="rId17"/>
+    <p:sldId id="269" r:id="rId18"/>
+    <p:sldId id="270" r:id="rId19"/>
+    <p:sldId id="279" r:id="rId20"/>
+    <p:sldId id="278" r:id="rId21"/>
+    <p:sldId id="280" r:id="rId22"/>
+    <p:sldId id="281" r:id="rId23"/>
+    <p:sldId id="259" r:id="rId24"/>
+    <p:sldId id="264" r:id="rId25"/>
+    <p:sldId id="265" r:id="rId26"/>
   </p:sldIdLst>
   <p:sldSz cx="12192000" cy="6858000"/>
   <p:notesSz cx="6858000" cy="9144000"/>
@@ -6914,125 +6918,6 @@
           <p:cNvPr id="2" name="Titolo 1">
             <a:extLst>
               <a:ext uri="{FF2B5EF4-FFF2-40B4-BE49-F238E27FC236}">
-                <a16:creationId xmlns:a16="http://schemas.microsoft.com/office/drawing/2014/main" id="{21FB7D41-B0F3-43C5-B5BF-6822A7CDCF4E}"/>
-              </a:ext>
-            </a:extLst>
-          </p:cNvPr>
-          <p:cNvSpPr>
-            <a:spLocks noGrp="1"/>
-          </p:cNvSpPr>
-          <p:nvPr>
-            <p:ph type="title"/>
-          </p:nvPr>
-        </p:nvSpPr>
-        <p:spPr/>
-        <p:txBody>
-          <a:bodyPr/>
-          <a:lstStyle/>
-          <a:p>
-            <a:pPr algn="ctr"/>
-            <a:r>
-              <a:rPr lang="it-IT" dirty="0"/>
-              <a:t>User Experience Evaluation</a:t>
-            </a:r>
-          </a:p>
-        </p:txBody>
-      </p:sp>
-      <p:sp>
-        <p:nvSpPr>
-          <p:cNvPr id="7" name="Segnaposto contenuto 6">
-            <a:extLst>
-              <a:ext uri="{FF2B5EF4-FFF2-40B4-BE49-F238E27FC236}">
-                <a16:creationId xmlns:a16="http://schemas.microsoft.com/office/drawing/2014/main" id="{02492732-561D-4081-A250-6628D2C8DB74}"/>
-              </a:ext>
-            </a:extLst>
-          </p:cNvPr>
-          <p:cNvSpPr>
-            <a:spLocks noGrp="1"/>
-          </p:cNvSpPr>
-          <p:nvPr>
-            <p:ph idx="1"/>
-          </p:nvPr>
-        </p:nvSpPr>
-        <p:spPr/>
-        <p:txBody>
-          <a:bodyPr/>
-          <a:lstStyle/>
-          <a:p>
-            <a:r>
-              <a:rPr lang="en-US" dirty="0"/>
-              <a:t>We are planning evaluate the user experience using mockups, and after every demo of these prototypes we will collect people's opinions asking for feedbacks and publishing some </a:t>
-            </a:r>
-            <a:r>
-              <a:rPr lang="en-US"/>
-              <a:t>google forms.</a:t>
-            </a:r>
-            <a:endParaRPr lang="en-US" dirty="0"/>
-          </a:p>
-          <a:p>
-            <a:r>
-              <a:rPr lang="en-US" dirty="0"/>
-              <a:t>The questions will be mainly on:</a:t>
-            </a:r>
-          </a:p>
-          <a:p>
-            <a:pPr lvl="1">
-              <a:buFont typeface="Arial" panose="020B0604020202020204" pitchFamily="34" charset="0"/>
-              <a:buChar char="•"/>
-            </a:pPr>
-            <a:r>
-              <a:rPr lang="en-US" dirty="0"/>
-              <a:t>User interface</a:t>
-            </a:r>
-          </a:p>
-          <a:p>
-            <a:pPr lvl="1">
-              <a:buFont typeface="Arial" panose="020B0604020202020204" pitchFamily="34" charset="0"/>
-              <a:buChar char="•"/>
-            </a:pPr>
-            <a:r>
-              <a:rPr lang="en-US" dirty="0"/>
-              <a:t>Application services</a:t>
-            </a:r>
-            <a:endParaRPr lang="it-IT" dirty="0"/>
-          </a:p>
-        </p:txBody>
-      </p:sp>
-    </p:spTree>
-    <p:extLst>
-      <p:ext uri="{BB962C8B-B14F-4D97-AF65-F5344CB8AC3E}">
-        <p14:creationId xmlns:p14="http://schemas.microsoft.com/office/powerpoint/2010/main" val="1327256278"/>
-      </p:ext>
-    </p:extLst>
-  </p:cSld>
-  <p:clrMapOvr>
-    <a:masterClrMapping/>
-  </p:clrMapOvr>
-</p:sld>
-</file>
-
-<file path=ppt/slides/slide12.xml><?xml version="1.0" encoding="utf-8"?>
-<p:sld xmlns:a="http://schemas.openxmlformats.org/drawingml/2006/main" xmlns:r="http://schemas.openxmlformats.org/officeDocument/2006/relationships" xmlns:p="http://schemas.openxmlformats.org/presentationml/2006/main">
-  <p:cSld>
-    <p:spTree>
-      <p:nvGrpSpPr>
-        <p:cNvPr id="1" name=""/>
-        <p:cNvGrpSpPr/>
-        <p:nvPr/>
-      </p:nvGrpSpPr>
-      <p:grpSpPr>
-        <a:xfrm>
-          <a:off x="0" y="0"/>
-          <a:ext cx="0" cy="0"/>
-          <a:chOff x="0" y="0"/>
-          <a:chExt cx="0" cy="0"/>
-        </a:xfrm>
-      </p:grpSpPr>
-      <p:sp>
-        <p:nvSpPr>
-          <p:cNvPr id="2" name="Titolo 1">
-            <a:extLst>
-              <a:ext uri="{FF2B5EF4-FFF2-40B4-BE49-F238E27FC236}">
                 <a16:creationId xmlns:a16="http://schemas.microsoft.com/office/drawing/2014/main" id="{11328D87-1E1B-428D-A8F9-376F5E4F4F66}"/>
               </a:ext>
             </a:extLst>
@@ -7078,9 +6963,18 @@
           <a:bodyPr/>
           <a:lstStyle/>
           <a:p>
+            <a:pPr lvl="1"/>
             <a:r>
               <a:rPr lang="it-IT" dirty="0" err="1"/>
-              <a:t>We</a:t>
+              <a:t>LoRaWAN</a:t>
+            </a:r>
+            <a:r>
+              <a:rPr lang="it-IT" dirty="0"/>
+              <a:t> and TTN </a:t>
+            </a:r>
+            <a:r>
+              <a:rPr lang="it-IT" dirty="0" err="1"/>
+              <a:t>not</a:t>
             </a:r>
             <a:r>
               <a:rPr lang="it-IT" dirty="0"/>
@@ -7088,218 +6982,13 @@
             </a:r>
             <a:r>
               <a:rPr lang="it-IT" dirty="0" err="1"/>
-              <a:t>will</a:t>
-            </a:r>
-            <a:r>
-              <a:rPr lang="it-IT" dirty="0"/>
-              <a:t> do a technical </a:t>
-            </a:r>
-            <a:r>
-              <a:rPr lang="it-IT" dirty="0" err="1"/>
-              <a:t>evaluation</a:t>
+              <a:t>used</a:t>
             </a:r>
             <a:r>
               <a:rPr lang="it-IT" dirty="0"/>
               <a:t> </a:t>
             </a:r>
             <a:r>
-              <a:rPr lang="en-US" dirty="0"/>
-              <a:t>performing</a:t>
-            </a:r>
-            <a:r>
-              <a:rPr lang="it-IT" dirty="0"/>
-              <a:t> </a:t>
-            </a:r>
-            <a:r>
-              <a:rPr lang="it-IT" dirty="0" err="1"/>
-              <a:t>load</a:t>
-            </a:r>
-            <a:r>
-              <a:rPr lang="it-IT" dirty="0"/>
-              <a:t> </a:t>
-            </a:r>
-            <a:r>
-              <a:rPr lang="it-IT" dirty="0" err="1"/>
-              <a:t>tests</a:t>
-            </a:r>
-            <a:r>
-              <a:rPr lang="it-IT" dirty="0"/>
-              <a:t> on </a:t>
-            </a:r>
-            <a:r>
-              <a:rPr lang="it-IT" dirty="0" err="1"/>
-              <a:t>all</a:t>
-            </a:r>
-            <a:r>
-              <a:rPr lang="it-IT" dirty="0"/>
-              <a:t> parts of </a:t>
-            </a:r>
-            <a:r>
-              <a:rPr lang="it-IT" dirty="0" err="1"/>
-              <a:t>our</a:t>
-            </a:r>
-            <a:r>
-              <a:rPr lang="it-IT" dirty="0"/>
-              <a:t> system:</a:t>
-            </a:r>
-          </a:p>
-          <a:p>
-            <a:pPr lvl="1">
-              <a:buFont typeface="Arial" panose="020B0604020202020204" pitchFamily="34" charset="0"/>
-              <a:buChar char="•"/>
-            </a:pPr>
-            <a:r>
-              <a:rPr lang="en-US" b="1" dirty="0"/>
-              <a:t>BLE</a:t>
-            </a:r>
-            <a:r>
-              <a:rPr lang="en-US" dirty="0"/>
-              <a:t> IoT device-Smartphone interaction: how many smartphones a single device can handle?</a:t>
-            </a:r>
-          </a:p>
-          <a:p>
-            <a:pPr lvl="1">
-              <a:buFont typeface="Arial" panose="020B0604020202020204" pitchFamily="34" charset="0"/>
-              <a:buChar char="•"/>
-            </a:pPr>
-            <a:r>
-              <a:rPr lang="en-US" b="1" dirty="0"/>
-              <a:t>Cloud</a:t>
-            </a:r>
-            <a:r>
-              <a:rPr lang="en-US" dirty="0"/>
-              <a:t> IoT device-Cloud interaction: what is the message rate with which the device can send messages to Azure IoT hub?</a:t>
-            </a:r>
-          </a:p>
-          <a:p>
-            <a:pPr lvl="1">
-              <a:buFont typeface="Arial" panose="020B0604020202020204" pitchFamily="34" charset="0"/>
-              <a:buChar char="•"/>
-            </a:pPr>
-            <a:r>
-              <a:rPr lang="en-US" b="1" dirty="0"/>
-              <a:t>Responsiveness</a:t>
-            </a:r>
-            <a:r>
-              <a:rPr lang="en-US" dirty="0"/>
-              <a:t> Cloud-Smartphone interaction: how fast the smartphone receives the advice on where to go, does it depend from the number of connected devices?</a:t>
-            </a:r>
-          </a:p>
-          <a:p>
-            <a:pPr lvl="1">
-              <a:buFont typeface="Arial" panose="020B0604020202020204" pitchFamily="34" charset="0"/>
-              <a:buChar char="•"/>
-            </a:pPr>
-            <a:endParaRPr lang="it-IT" dirty="0"/>
-          </a:p>
-        </p:txBody>
-      </p:sp>
-    </p:spTree>
-    <p:extLst>
-      <p:ext uri="{BB962C8B-B14F-4D97-AF65-F5344CB8AC3E}">
-        <p14:creationId xmlns:p14="http://schemas.microsoft.com/office/powerpoint/2010/main" val="3231330441"/>
-      </p:ext>
-    </p:extLst>
-  </p:cSld>
-  <p:clrMapOvr>
-    <a:masterClrMapping/>
-  </p:clrMapOvr>
-</p:sld>
-</file>
-
-<file path=ppt/slides/slide13.xml><?xml version="1.0" encoding="utf-8"?>
-<p:sld xmlns:a="http://schemas.openxmlformats.org/drawingml/2006/main" xmlns:r="http://schemas.openxmlformats.org/officeDocument/2006/relationships" xmlns:p="http://schemas.openxmlformats.org/presentationml/2006/main">
-  <p:cSld>
-    <p:spTree>
-      <p:nvGrpSpPr>
-        <p:cNvPr id="1" name=""/>
-        <p:cNvGrpSpPr/>
-        <p:nvPr/>
-      </p:nvGrpSpPr>
-      <p:grpSpPr>
-        <a:xfrm>
-          <a:off x="0" y="0"/>
-          <a:ext cx="0" cy="0"/>
-          <a:chOff x="0" y="0"/>
-          <a:chExt cx="0" cy="0"/>
-        </a:xfrm>
-      </p:grpSpPr>
-      <p:sp>
-        <p:nvSpPr>
-          <p:cNvPr id="2" name="Titolo 1">
-            <a:extLst>
-              <a:ext uri="{FF2B5EF4-FFF2-40B4-BE49-F238E27FC236}">
-                <a16:creationId xmlns:a16="http://schemas.microsoft.com/office/drawing/2014/main" id="{11328D87-1E1B-428D-A8F9-376F5E4F4F66}"/>
-              </a:ext>
-            </a:extLst>
-          </p:cNvPr>
-          <p:cNvSpPr>
-            <a:spLocks noGrp="1"/>
-          </p:cNvSpPr>
-          <p:nvPr>
-            <p:ph type="title"/>
-          </p:nvPr>
-        </p:nvSpPr>
-        <p:spPr/>
-        <p:txBody>
-          <a:bodyPr/>
-          <a:lstStyle/>
-          <a:p>
-            <a:pPr algn="ctr"/>
-            <a:r>
-              <a:rPr lang="it-IT" dirty="0"/>
-              <a:t>Technical Evaluation</a:t>
-            </a:r>
-          </a:p>
-        </p:txBody>
-      </p:sp>
-      <p:sp>
-        <p:nvSpPr>
-          <p:cNvPr id="3" name="Segnaposto contenuto 2">
-            <a:extLst>
-              <a:ext uri="{FF2B5EF4-FFF2-40B4-BE49-F238E27FC236}">
-                <a16:creationId xmlns:a16="http://schemas.microsoft.com/office/drawing/2014/main" id="{94146EE0-BFD9-4D7A-8828-8629B6A54869}"/>
-              </a:ext>
-            </a:extLst>
-          </p:cNvPr>
-          <p:cNvSpPr>
-            <a:spLocks noGrp="1"/>
-          </p:cNvSpPr>
-          <p:nvPr>
-            <p:ph idx="1"/>
-          </p:nvPr>
-        </p:nvSpPr>
-        <p:spPr/>
-        <p:txBody>
-          <a:bodyPr/>
-          <a:lstStyle/>
-          <a:p>
-            <a:pPr lvl="1"/>
-            <a:r>
-              <a:rPr lang="it-IT" dirty="0" err="1"/>
-              <a:t>LoRaWAN</a:t>
-            </a:r>
-            <a:r>
-              <a:rPr lang="it-IT" dirty="0"/>
-              <a:t> and TTN </a:t>
-            </a:r>
-            <a:r>
-              <a:rPr lang="it-IT" dirty="0" err="1"/>
-              <a:t>not</a:t>
-            </a:r>
-            <a:r>
-              <a:rPr lang="it-IT" dirty="0"/>
-              <a:t> </a:t>
-            </a:r>
-            <a:r>
-              <a:rPr lang="it-IT" dirty="0" err="1"/>
-              <a:t>used</a:t>
-            </a:r>
-            <a:r>
-              <a:rPr lang="it-IT" dirty="0"/>
-              <a:t> </a:t>
-            </a:r>
-            <a:r>
               <a:rPr lang="it-IT" dirty="0" err="1"/>
               <a:t>anymore</a:t>
             </a:r>
@@ -7312,7 +7001,7 @@
             <a:pPr lvl="2"/>
             <a:r>
               <a:rPr lang="it-IT" dirty="0"/>
-              <a:t>40% of </a:t>
+              <a:t>60% of </a:t>
             </a:r>
             <a:r>
               <a:rPr lang="it-IT" dirty="0" err="1"/>
@@ -7541,7 +7230,7 @@
 </p:sld>
 </file>
 
-<file path=ppt/slides/slide14.xml><?xml version="1.0" encoding="utf-8"?>
+<file path=ppt/slides/slide12.xml><?xml version="1.0" encoding="utf-8"?>
 <p:sld xmlns:a="http://schemas.openxmlformats.org/drawingml/2006/main" xmlns:r="http://schemas.openxmlformats.org/officeDocument/2006/relationships" xmlns:p="http://schemas.openxmlformats.org/presentationml/2006/main">
   <p:cSld>
     <p:spTree>
@@ -7711,7 +7400,7 @@
 </p:sld>
 </file>
 
-<file path=ppt/slides/slide15.xml><?xml version="1.0" encoding="utf-8"?>
+<file path=ppt/slides/slide13.xml><?xml version="1.0" encoding="utf-8"?>
 <p:sld xmlns:a="http://schemas.openxmlformats.org/drawingml/2006/main" xmlns:r="http://schemas.openxmlformats.org/officeDocument/2006/relationships" xmlns:p="http://schemas.openxmlformats.org/presentationml/2006/main">
   <p:cSld>
     <p:bg>
@@ -7857,7 +7546,7 @@
 </p:sld>
 </file>
 
-<file path=ppt/slides/slide16.xml><?xml version="1.0" encoding="utf-8"?>
+<file path=ppt/slides/slide14.xml><?xml version="1.0" encoding="utf-8"?>
 <p:sld xmlns:a="http://schemas.openxmlformats.org/drawingml/2006/main" xmlns:r="http://schemas.openxmlformats.org/officeDocument/2006/relationships" xmlns:p="http://schemas.openxmlformats.org/presentationml/2006/main">
   <p:cSld>
     <p:spTree>
@@ -7907,6 +7596,396 @@
     <p:extLst>
       <p:ext uri="{BB962C8B-B14F-4D97-AF65-F5344CB8AC3E}">
         <p14:creationId xmlns:p14="http://schemas.microsoft.com/office/powerpoint/2010/main" val="1768634027"/>
+      </p:ext>
+    </p:extLst>
+  </p:cSld>
+  <p:clrMapOvr>
+    <a:masterClrMapping/>
+  </p:clrMapOvr>
+</p:sld>
+</file>
+
+<file path=ppt/slides/slide15.xml><?xml version="1.0" encoding="utf-8"?>
+<p:sld xmlns:a="http://schemas.openxmlformats.org/drawingml/2006/main" xmlns:r="http://schemas.openxmlformats.org/officeDocument/2006/relationships" xmlns:p="http://schemas.openxmlformats.org/presentationml/2006/main">
+  <p:cSld>
+    <p:bg>
+      <p:bgPr>
+        <a:solidFill>
+          <a:schemeClr val="bg1"/>
+        </a:solidFill>
+        <a:effectLst/>
+      </p:bgPr>
+    </p:bg>
+    <p:spTree>
+      <p:nvGrpSpPr>
+        <p:cNvPr id="1" name=""/>
+        <p:cNvGrpSpPr/>
+        <p:nvPr/>
+      </p:nvGrpSpPr>
+      <p:grpSpPr>
+        <a:xfrm>
+          <a:off x="0" y="0"/>
+          <a:ext cx="0" cy="0"/>
+          <a:chOff x="0" y="0"/>
+          <a:chExt cx="0" cy="0"/>
+        </a:xfrm>
+      </p:grpSpPr>
+      <p:sp>
+        <p:nvSpPr>
+          <p:cNvPr id="2" name="Titolo 1">
+            <a:extLst>
+              <a:ext uri="{FF2B5EF4-FFF2-40B4-BE49-F238E27FC236}">
+                <a16:creationId xmlns:a16="http://schemas.microsoft.com/office/drawing/2014/main" id="{3FC298E9-7046-42C3-8E80-7FC0E5DD35BB}"/>
+              </a:ext>
+            </a:extLst>
+          </p:cNvPr>
+          <p:cNvSpPr>
+            <a:spLocks noGrp="1"/>
+          </p:cNvSpPr>
+          <p:nvPr>
+            <p:ph type="title"/>
+          </p:nvPr>
+        </p:nvSpPr>
+        <p:spPr>
+          <a:xfrm>
+            <a:off x="4349123" y="609600"/>
+            <a:ext cx="4924878" cy="1320800"/>
+          </a:xfrm>
+        </p:spPr>
+        <p:txBody>
+          <a:bodyPr vert="horz" lIns="91440" tIns="45720" rIns="91440" bIns="45720" rtlCol="0" anchor="ctr">
+            <a:normAutofit/>
+          </a:bodyPr>
+          <a:lstStyle/>
+          <a:p>
+            <a:r>
+              <a:rPr lang="en-US"/>
+              <a:t>Typical scenario</a:t>
+            </a:r>
+          </a:p>
+        </p:txBody>
+      </p:sp>
+      <p:pic>
+        <p:nvPicPr>
+          <p:cNvPr id="5" name="Segnaposto contenuto 4" descr="Immagine che contiene orologio&#10;&#10;Descrizione generata automaticamente">
+            <a:extLst>
+              <a:ext uri="{FF2B5EF4-FFF2-40B4-BE49-F238E27FC236}">
+                <a16:creationId xmlns:a16="http://schemas.microsoft.com/office/drawing/2014/main" id="{78E2DCE6-6DCA-4354-9F65-6C8DEE426671}"/>
+              </a:ext>
+            </a:extLst>
+          </p:cNvPr>
+          <p:cNvPicPr>
+            <a:picLocks noGrp="1" noChangeAspect="1"/>
+          </p:cNvPicPr>
+          <p:nvPr>
+            <p:ph idx="1"/>
+          </p:nvPr>
+        </p:nvPicPr>
+        <p:blipFill>
+          <a:blip r:embed="rId2">
+            <a:extLst>
+              <a:ext uri="{28A0092B-C50C-407E-A947-70E740481C1C}">
+                <a14:useLocalDpi xmlns:a14="http://schemas.microsoft.com/office/drawing/2010/main" val="0"/>
+              </a:ext>
+            </a:extLst>
+          </a:blip>
+          <a:stretch>
+            <a:fillRect/>
+          </a:stretch>
+        </p:blipFill>
+        <p:spPr>
+          <a:xfrm>
+            <a:off x="799814" y="870263"/>
+            <a:ext cx="3251701" cy="4964429"/>
+          </a:xfrm>
+          <a:prstGeom prst="rect">
+            <a:avLst/>
+          </a:prstGeom>
+        </p:spPr>
+      </p:pic>
+      <p:sp>
+        <p:nvSpPr>
+          <p:cNvPr id="3" name="CasellaDiTesto 2">
+            <a:extLst>
+              <a:ext uri="{FF2B5EF4-FFF2-40B4-BE49-F238E27FC236}">
+                <a16:creationId xmlns:a16="http://schemas.microsoft.com/office/drawing/2014/main" id="{7C8434E7-57E8-4413-BF56-6CAC749B9ACC}"/>
+              </a:ext>
+            </a:extLst>
+          </p:cNvPr>
+          <p:cNvSpPr txBox="1"/>
+          <p:nvPr/>
+        </p:nvSpPr>
+        <p:spPr>
+          <a:xfrm>
+            <a:off x="4349123" y="2160590"/>
+            <a:ext cx="4924878" cy="1320800"/>
+          </a:xfrm>
+          <a:prstGeom prst="rect">
+            <a:avLst/>
+          </a:prstGeom>
+        </p:spPr>
+        <p:txBody>
+          <a:bodyPr vert="horz" lIns="91440" tIns="45720" rIns="91440" bIns="45720" rtlCol="0">
+            <a:normAutofit/>
+          </a:bodyPr>
+          <a:lstStyle/>
+          <a:p>
+            <a:pPr marL="285750" indent="-285750">
+              <a:spcBef>
+                <a:spcPts val="1000"/>
+              </a:spcBef>
+              <a:buClr>
+                <a:schemeClr val="accent1"/>
+              </a:buClr>
+              <a:buSzPct val="80000"/>
+              <a:buFont typeface="Wingdings 3" charset="2"/>
+              <a:buChar char=""/>
+            </a:pPr>
+            <a:r>
+              <a:rPr lang="en-US" dirty="0">
+                <a:solidFill>
+                  <a:schemeClr val="tx1">
+                    <a:lumMod val="75000"/>
+                    <a:lumOff val="25000"/>
+                  </a:schemeClr>
+                </a:solidFill>
+              </a:rPr>
+              <a:t>BLE technology</a:t>
+            </a:r>
+          </a:p>
+          <a:p>
+            <a:pPr marL="285750" indent="-285750">
+              <a:spcBef>
+                <a:spcPts val="1000"/>
+              </a:spcBef>
+              <a:buClr>
+                <a:schemeClr val="accent1"/>
+              </a:buClr>
+              <a:buSzPct val="80000"/>
+              <a:buFont typeface="Wingdings 3" charset="2"/>
+              <a:buChar char=""/>
+            </a:pPr>
+            <a:r>
+              <a:rPr lang="en-US" dirty="0">
+                <a:solidFill>
+                  <a:schemeClr val="tx1">
+                    <a:lumMod val="75000"/>
+                    <a:lumOff val="25000"/>
+                  </a:schemeClr>
+                </a:solidFill>
+              </a:rPr>
+              <a:t>Bluetooth beacon functionality </a:t>
+            </a:r>
+          </a:p>
+        </p:txBody>
+      </p:sp>
+    </p:spTree>
+    <p:extLst>
+      <p:ext uri="{BB962C8B-B14F-4D97-AF65-F5344CB8AC3E}">
+        <p14:creationId xmlns:p14="http://schemas.microsoft.com/office/powerpoint/2010/main" val="2389307703"/>
+      </p:ext>
+    </p:extLst>
+  </p:cSld>
+  <p:clrMapOvr>
+    <a:masterClrMapping/>
+  </p:clrMapOvr>
+</p:sld>
+</file>
+
+<file path=ppt/slides/slide16.xml><?xml version="1.0" encoding="utf-8"?>
+<p:sld xmlns:a="http://schemas.openxmlformats.org/drawingml/2006/main" xmlns:r="http://schemas.openxmlformats.org/officeDocument/2006/relationships" xmlns:p="http://schemas.openxmlformats.org/presentationml/2006/main">
+  <p:cSld>
+    <p:bg>
+      <p:bgPr>
+        <a:solidFill>
+          <a:schemeClr val="bg1"/>
+        </a:solidFill>
+        <a:effectLst/>
+      </p:bgPr>
+    </p:bg>
+    <p:spTree>
+      <p:nvGrpSpPr>
+        <p:cNvPr id="1" name=""/>
+        <p:cNvGrpSpPr/>
+        <p:nvPr/>
+      </p:nvGrpSpPr>
+      <p:grpSpPr>
+        <a:xfrm>
+          <a:off x="0" y="0"/>
+          <a:ext cx="0" cy="0"/>
+          <a:chOff x="0" y="0"/>
+          <a:chExt cx="0" cy="0"/>
+        </a:xfrm>
+      </p:grpSpPr>
+      <p:sp>
+        <p:nvSpPr>
+          <p:cNvPr id="6" name="Titolo 1">
+            <a:extLst>
+              <a:ext uri="{FF2B5EF4-FFF2-40B4-BE49-F238E27FC236}">
+                <a16:creationId xmlns:a16="http://schemas.microsoft.com/office/drawing/2014/main" id="{D1F7B3F1-2508-47C1-BEAA-17F323F3BB42}"/>
+              </a:ext>
+            </a:extLst>
+          </p:cNvPr>
+          <p:cNvSpPr>
+            <a:spLocks noGrp="1"/>
+          </p:cNvSpPr>
+          <p:nvPr>
+            <p:ph type="title"/>
+          </p:nvPr>
+        </p:nvSpPr>
+        <p:spPr>
+          <a:xfrm>
+            <a:off x="677334" y="609600"/>
+            <a:ext cx="8596668" cy="1320800"/>
+          </a:xfrm>
+        </p:spPr>
+        <p:txBody>
+          <a:bodyPr vert="horz" lIns="91440" tIns="45720" rIns="91440" bIns="45720" rtlCol="0" anchor="t">
+            <a:normAutofit/>
+          </a:bodyPr>
+          <a:lstStyle/>
+          <a:p>
+            <a:r>
+              <a:rPr lang="en-US" dirty="0"/>
+              <a:t>MQTT Protocol</a:t>
+            </a:r>
+          </a:p>
+        </p:txBody>
+      </p:sp>
+      <p:sp>
+        <p:nvSpPr>
+          <p:cNvPr id="4" name="CasellaDiTesto 3">
+            <a:extLst>
+              <a:ext uri="{FF2B5EF4-FFF2-40B4-BE49-F238E27FC236}">
+                <a16:creationId xmlns:a16="http://schemas.microsoft.com/office/drawing/2014/main" id="{13C24BF3-58D1-4271-84B5-E0DE8DB341A6}"/>
+              </a:ext>
+            </a:extLst>
+          </p:cNvPr>
+          <p:cNvSpPr txBox="1"/>
+          <p:nvPr/>
+        </p:nvSpPr>
+        <p:spPr>
+          <a:xfrm>
+            <a:off x="6416039" y="2160589"/>
+            <a:ext cx="3770108" cy="3880773"/>
+          </a:xfrm>
+          <a:prstGeom prst="rect">
+            <a:avLst/>
+          </a:prstGeom>
+        </p:spPr>
+        <p:txBody>
+          <a:bodyPr vert="horz" lIns="91440" tIns="45720" rIns="91440" bIns="45720" rtlCol="0">
+            <a:normAutofit/>
+          </a:bodyPr>
+          <a:lstStyle/>
+          <a:p>
+            <a:pPr marL="285750" indent="-285750">
+              <a:spcBef>
+                <a:spcPts val="1000"/>
+              </a:spcBef>
+              <a:buClr>
+                <a:schemeClr val="accent1"/>
+              </a:buClr>
+              <a:buSzPct val="80000"/>
+              <a:buFont typeface="Wingdings 3" charset="2"/>
+              <a:buChar char=""/>
+            </a:pPr>
+            <a:r>
+              <a:rPr lang="en-US" sz="1500" dirty="0">
+                <a:solidFill>
+                  <a:schemeClr val="tx1">
+                    <a:lumMod val="75000"/>
+                    <a:lumOff val="25000"/>
+                  </a:schemeClr>
+                </a:solidFill>
+              </a:rPr>
+              <a:t>MQTT protocol</a:t>
+            </a:r>
+          </a:p>
+          <a:p>
+            <a:pPr marL="285750" indent="-285750">
+              <a:spcBef>
+                <a:spcPts val="1000"/>
+              </a:spcBef>
+              <a:buClr>
+                <a:schemeClr val="accent1"/>
+              </a:buClr>
+              <a:buSzPct val="80000"/>
+              <a:buFont typeface="Wingdings 3" charset="2"/>
+              <a:buChar char=""/>
+            </a:pPr>
+            <a:r>
+              <a:rPr lang="en-US" sz="1500" dirty="0">
+                <a:solidFill>
+                  <a:schemeClr val="tx1">
+                    <a:lumMod val="75000"/>
+                    <a:lumOff val="25000"/>
+                  </a:schemeClr>
+                </a:solidFill>
+              </a:rPr>
+              <a:t>Eclipse </a:t>
+            </a:r>
+            <a:r>
+              <a:rPr lang="en-US" sz="1500" dirty="0" err="1">
+                <a:solidFill>
+                  <a:schemeClr val="tx1">
+                    <a:lumMod val="75000"/>
+                    <a:lumOff val="25000"/>
+                  </a:schemeClr>
+                </a:solidFill>
+              </a:rPr>
+              <a:t>Mosquitto</a:t>
+            </a:r>
+            <a:r>
+              <a:rPr lang="en-US" sz="1500" dirty="0">
+                <a:solidFill>
+                  <a:schemeClr val="tx1">
+                    <a:lumMod val="75000"/>
+                    <a:lumOff val="25000"/>
+                  </a:schemeClr>
+                </a:solidFill>
+              </a:rPr>
+              <a:t> MQTT Broker</a:t>
+            </a:r>
+          </a:p>
+        </p:txBody>
+      </p:sp>
+      <p:pic>
+        <p:nvPicPr>
+          <p:cNvPr id="7" name="Segnaposto contenuto 6">
+            <a:extLst>
+              <a:ext uri="{FF2B5EF4-FFF2-40B4-BE49-F238E27FC236}">
+                <a16:creationId xmlns:a16="http://schemas.microsoft.com/office/drawing/2014/main" id="{A127DB2F-2E16-4F67-AA8E-68E1A8F6CAE1}"/>
+              </a:ext>
+            </a:extLst>
+          </p:cNvPr>
+          <p:cNvPicPr>
+            <a:picLocks noGrp="1" noChangeAspect="1"/>
+          </p:cNvPicPr>
+          <p:nvPr>
+            <p:ph idx="1"/>
+          </p:nvPr>
+        </p:nvPicPr>
+        <p:blipFill>
+          <a:blip r:embed="rId2"/>
+          <a:stretch>
+            <a:fillRect/>
+          </a:stretch>
+        </p:blipFill>
+        <p:spPr>
+          <a:xfrm>
+            <a:off x="875606" y="1488281"/>
+            <a:ext cx="3023708" cy="3881437"/>
+          </a:xfrm>
+          <a:prstGeom prst="rect">
+            <a:avLst/>
+          </a:prstGeom>
+        </p:spPr>
+      </p:pic>
+    </p:spTree>
+    <p:extLst>
+      <p:ext uri="{BB962C8B-B14F-4D97-AF65-F5344CB8AC3E}">
+        <p14:creationId xmlns:p14="http://schemas.microsoft.com/office/powerpoint/2010/main" val="883328262"/>
       </p:ext>
     </p:extLst>
   </p:cSld>
@@ -7946,7 +8025,7 @@
           <p:cNvPr id="2" name="Titolo 1">
             <a:extLst>
               <a:ext uri="{FF2B5EF4-FFF2-40B4-BE49-F238E27FC236}">
-                <a16:creationId xmlns:a16="http://schemas.microsoft.com/office/drawing/2014/main" id="{3FC298E9-7046-42C3-8E80-7FC0E5DD35BB}"/>
+                <a16:creationId xmlns:a16="http://schemas.microsoft.com/office/drawing/2014/main" id="{A1169DF2-87A9-4375-91BC-87D5EC2C6A12}"/>
               </a:ext>
             </a:extLst>
           </p:cNvPr>
@@ -7959,29 +8038,153 @@
         </p:nvSpPr>
         <p:spPr>
           <a:xfrm>
-            <a:off x="4349123" y="609600"/>
-            <a:ext cx="4924878" cy="1320800"/>
+            <a:off x="677334" y="609600"/>
+            <a:ext cx="8596668" cy="1320800"/>
           </a:xfrm>
         </p:spPr>
         <p:txBody>
-          <a:bodyPr vert="horz" lIns="91440" tIns="45720" rIns="91440" bIns="45720" rtlCol="0" anchor="ctr">
+          <a:bodyPr vert="horz" lIns="91440" tIns="45720" rIns="91440" bIns="45720" rtlCol="0" anchor="t">
             <a:normAutofit/>
           </a:bodyPr>
           <a:lstStyle/>
           <a:p>
             <a:r>
               <a:rPr lang="en-US"/>
-              <a:t>Typical scenario</a:t>
+              <a:t>Cloud Services</a:t>
+            </a:r>
+          </a:p>
+        </p:txBody>
+      </p:sp>
+      <p:sp>
+        <p:nvSpPr>
+          <p:cNvPr id="4" name="CasellaDiTesto 3">
+            <a:extLst>
+              <a:ext uri="{FF2B5EF4-FFF2-40B4-BE49-F238E27FC236}">
+                <a16:creationId xmlns:a16="http://schemas.microsoft.com/office/drawing/2014/main" id="{72D8A3AA-4D53-4451-8078-37D5402C2824}"/>
+              </a:ext>
+            </a:extLst>
+          </p:cNvPr>
+          <p:cNvSpPr txBox="1"/>
+          <p:nvPr/>
+        </p:nvSpPr>
+        <p:spPr>
+          <a:xfrm>
+            <a:off x="6481461" y="4835295"/>
+            <a:ext cx="2927185" cy="3880773"/>
+          </a:xfrm>
+          <a:prstGeom prst="rect">
+            <a:avLst/>
+          </a:prstGeom>
+        </p:spPr>
+        <p:txBody>
+          <a:bodyPr vert="horz" lIns="91440" tIns="45720" rIns="91440" bIns="45720" rtlCol="0">
+            <a:normAutofit/>
+          </a:bodyPr>
+          <a:lstStyle/>
+          <a:p>
+            <a:pPr marL="285750" indent="-285750">
+              <a:spcBef>
+                <a:spcPts val="1000"/>
+              </a:spcBef>
+              <a:buClr>
+                <a:schemeClr val="accent1"/>
+              </a:buClr>
+              <a:buSzPct val="80000"/>
+              <a:buFont typeface="Wingdings 3" charset="2"/>
+              <a:buChar char=""/>
+            </a:pPr>
+            <a:r>
+              <a:rPr lang="en-US" sz="1500" dirty="0">
+                <a:solidFill>
+                  <a:schemeClr val="tx1">
+                    <a:lumMod val="75000"/>
+                    <a:lumOff val="25000"/>
+                  </a:schemeClr>
+                </a:solidFill>
+              </a:rPr>
+              <a:t>Azure Cloud services</a:t>
+            </a:r>
+          </a:p>
+          <a:p>
+            <a:pPr marL="742950" lvl="1" indent="-285750">
+              <a:spcBef>
+                <a:spcPts val="1000"/>
+              </a:spcBef>
+              <a:buClr>
+                <a:schemeClr val="accent1"/>
+              </a:buClr>
+              <a:buSzPct val="80000"/>
+              <a:buFont typeface="Wingdings 3" charset="2"/>
+              <a:buChar char=""/>
+            </a:pPr>
+            <a:r>
+              <a:rPr lang="en-US" sz="1500" dirty="0">
+                <a:solidFill>
+                  <a:schemeClr val="tx1">
+                    <a:lumMod val="75000"/>
+                    <a:lumOff val="25000"/>
+                  </a:schemeClr>
+                </a:solidFill>
+              </a:rPr>
+              <a:t>Azure Function</a:t>
+            </a:r>
+          </a:p>
+          <a:p>
+            <a:pPr marL="742950" lvl="1" indent="-285750">
+              <a:spcBef>
+                <a:spcPts val="1000"/>
+              </a:spcBef>
+              <a:buClr>
+                <a:schemeClr val="accent1"/>
+              </a:buClr>
+              <a:buSzPct val="80000"/>
+              <a:buFont typeface="Wingdings 3" charset="2"/>
+              <a:buChar char=""/>
+            </a:pPr>
+            <a:r>
+              <a:rPr lang="en-US" sz="1500" dirty="0">
+                <a:solidFill>
+                  <a:schemeClr val="tx1">
+                    <a:lumMod val="75000"/>
+                    <a:lumOff val="25000"/>
+                  </a:schemeClr>
+                </a:solidFill>
+              </a:rPr>
+              <a:t>Azure IoT Hub</a:t>
+            </a:r>
+          </a:p>
+          <a:p>
+            <a:pPr marL="742950" lvl="1" indent="-285750">
+              <a:spcBef>
+                <a:spcPts val="1000"/>
+              </a:spcBef>
+              <a:buClr>
+                <a:schemeClr val="accent1"/>
+              </a:buClr>
+              <a:buSzPct val="80000"/>
+              <a:buFont typeface="Wingdings 3" charset="2"/>
+              <a:buChar char=""/>
+            </a:pPr>
+            <a:r>
+              <a:rPr lang="en-US" sz="1500" dirty="0">
+                <a:solidFill>
+                  <a:schemeClr val="tx1">
+                    <a:lumMod val="75000"/>
+                    <a:lumOff val="25000"/>
+                  </a:schemeClr>
+                </a:solidFill>
+              </a:rPr>
+              <a:t>Azure SQL DB</a:t>
             </a:r>
           </a:p>
         </p:txBody>
       </p:sp>
       <p:pic>
         <p:nvPicPr>
-          <p:cNvPr id="5" name="Segnaposto contenuto 4" descr="Immagine che contiene orologio&#10;&#10;Descrizione generata automaticamente">
+          <p:cNvPr id="8" name="Segnaposto contenuto 7">
             <a:extLst>
               <a:ext uri="{FF2B5EF4-FFF2-40B4-BE49-F238E27FC236}">
-                <a16:creationId xmlns:a16="http://schemas.microsoft.com/office/drawing/2014/main" id="{78E2DCE6-6DCA-4354-9F65-6C8DEE426671}"/>
+                <a16:creationId xmlns:a16="http://schemas.microsoft.com/office/drawing/2014/main" id="{31341ABE-CC58-492C-82F9-18886BB441B0}"/>
               </a:ext>
             </a:extLst>
           </p:cNvPr>
@@ -8006,94 +8209,15 @@
         </p:blipFill>
         <p:spPr>
           <a:xfrm>
-            <a:off x="799814" y="870263"/>
-            <a:ext cx="3251701" cy="4964429"/>
+            <a:off x="812334" y="1607752"/>
+            <a:ext cx="8596312" cy="2822130"/>
           </a:xfrm>
-          <a:prstGeom prst="rect">
-            <a:avLst/>
-          </a:prstGeom>
         </p:spPr>
       </p:pic>
-      <p:sp>
-        <p:nvSpPr>
-          <p:cNvPr id="3" name="CasellaDiTesto 2">
-            <a:extLst>
-              <a:ext uri="{FF2B5EF4-FFF2-40B4-BE49-F238E27FC236}">
-                <a16:creationId xmlns:a16="http://schemas.microsoft.com/office/drawing/2014/main" id="{7C8434E7-57E8-4413-BF56-6CAC749B9ACC}"/>
-              </a:ext>
-            </a:extLst>
-          </p:cNvPr>
-          <p:cNvSpPr txBox="1"/>
-          <p:nvPr/>
-        </p:nvSpPr>
-        <p:spPr>
-          <a:xfrm>
-            <a:off x="4349123" y="2160590"/>
-            <a:ext cx="4924878" cy="1320800"/>
-          </a:xfrm>
-          <a:prstGeom prst="rect">
-            <a:avLst/>
-          </a:prstGeom>
-        </p:spPr>
-        <p:txBody>
-          <a:bodyPr vert="horz" lIns="91440" tIns="45720" rIns="91440" bIns="45720" rtlCol="0">
-            <a:normAutofit/>
-          </a:bodyPr>
-          <a:lstStyle/>
-          <a:p>
-            <a:pPr marL="285750" indent="-285750">
-              <a:spcBef>
-                <a:spcPts val="1000"/>
-              </a:spcBef>
-              <a:buClr>
-                <a:schemeClr val="accent1"/>
-              </a:buClr>
-              <a:buSzPct val="80000"/>
-              <a:buFont typeface="Wingdings 3" charset="2"/>
-              <a:buChar char=""/>
-            </a:pPr>
-            <a:r>
-              <a:rPr lang="en-US" dirty="0">
-                <a:solidFill>
-                  <a:schemeClr val="tx1">
-                    <a:lumMod val="75000"/>
-                    <a:lumOff val="25000"/>
-                  </a:schemeClr>
-                </a:solidFill>
-              </a:rPr>
-              <a:t>BLE technology</a:t>
-            </a:r>
-          </a:p>
-          <a:p>
-            <a:pPr marL="285750" indent="-285750">
-              <a:spcBef>
-                <a:spcPts val="1000"/>
-              </a:spcBef>
-              <a:buClr>
-                <a:schemeClr val="accent1"/>
-              </a:buClr>
-              <a:buSzPct val="80000"/>
-              <a:buFont typeface="Wingdings 3" charset="2"/>
-              <a:buChar char=""/>
-            </a:pPr>
-            <a:r>
-              <a:rPr lang="en-US" dirty="0">
-                <a:solidFill>
-                  <a:schemeClr val="tx1">
-                    <a:lumMod val="75000"/>
-                    <a:lumOff val="25000"/>
-                  </a:schemeClr>
-                </a:solidFill>
-              </a:rPr>
-              <a:t>Bluetooth beacon functionality </a:t>
-            </a:r>
-          </a:p>
-        </p:txBody>
-      </p:sp>
     </p:spTree>
     <p:extLst>
       <p:ext uri="{BB962C8B-B14F-4D97-AF65-F5344CB8AC3E}">
-        <p14:creationId xmlns:p14="http://schemas.microsoft.com/office/powerpoint/2010/main" val="2389307703"/>
+        <p14:creationId xmlns:p14="http://schemas.microsoft.com/office/powerpoint/2010/main" val="2727602274"/>
       </p:ext>
     </p:extLst>
   </p:cSld>
@@ -8130,10 +8254,10 @@
       </p:grpSpPr>
       <p:sp>
         <p:nvSpPr>
-          <p:cNvPr id="6" name="Titolo 1">
+          <p:cNvPr id="2" name="Titolo 1">
             <a:extLst>
               <a:ext uri="{FF2B5EF4-FFF2-40B4-BE49-F238E27FC236}">
-                <a16:creationId xmlns:a16="http://schemas.microsoft.com/office/drawing/2014/main" id="{D1F7B3F1-2508-47C1-BEAA-17F323F3BB42}"/>
+                <a16:creationId xmlns:a16="http://schemas.microsoft.com/office/drawing/2014/main" id="{6E26A17A-2562-4957-80E5-96961E3462A0}"/>
               </a:ext>
             </a:extLst>
           </p:cNvPr>
@@ -8146,19 +8270,20 @@
         </p:nvSpPr>
         <p:spPr>
           <a:xfrm>
-            <a:off x="677334" y="609600"/>
-            <a:ext cx="8596668" cy="1320800"/>
+            <a:off x="1110193" y="359436"/>
+            <a:ext cx="6591389" cy="1320800"/>
           </a:xfrm>
         </p:spPr>
         <p:txBody>
-          <a:bodyPr vert="horz" lIns="91440" tIns="45720" rIns="91440" bIns="45720" rtlCol="0" anchor="t">
+          <a:bodyPr vert="horz" lIns="91440" tIns="45720" rIns="91440" bIns="45720" rtlCol="0" anchor="ctr">
             <a:normAutofit/>
           </a:bodyPr>
           <a:lstStyle/>
           <a:p>
+            <a:pPr algn="ctr"/>
             <a:r>
               <a:rPr lang="en-US" dirty="0"/>
-              <a:t>MQTT Protocol</a:t>
+              <a:t>The complete flow</a:t>
             </a:r>
           </a:p>
         </p:txBody>
@@ -8168,7 +8293,7 @@
           <p:cNvPr id="4" name="CasellaDiTesto 3">
             <a:extLst>
               <a:ext uri="{FF2B5EF4-FFF2-40B4-BE49-F238E27FC236}">
-                <a16:creationId xmlns:a16="http://schemas.microsoft.com/office/drawing/2014/main" id="{13C24BF3-58D1-4271-84B5-E0DE8DB341A6}"/>
+                <a16:creationId xmlns:a16="http://schemas.microsoft.com/office/drawing/2014/main" id="{117390EB-2DE8-4F8E-883C-A3C63882A628}"/>
               </a:ext>
             </a:extLst>
           </p:cNvPr>
@@ -8177,8 +8302,8 @@
         </p:nvSpPr>
         <p:spPr>
           <a:xfrm>
-            <a:off x="6416039" y="2160589"/>
-            <a:ext cx="3770108" cy="3880773"/>
+            <a:off x="4405887" y="5164261"/>
+            <a:ext cx="5912224" cy="3560733"/>
           </a:xfrm>
           <a:prstGeom prst="rect">
             <a:avLst/>
@@ -8202,7 +8327,7 @@
               <a:buChar char=""/>
             </a:pPr>
             <a:r>
-              <a:rPr lang="en-US" sz="1500" dirty="0">
+              <a:rPr lang="en-US" dirty="0">
                 <a:solidFill>
                   <a:schemeClr val="tx1">
                     <a:lumMod val="75000"/>
@@ -8210,93 +8335,64 @@
                   </a:schemeClr>
                 </a:solidFill>
               </a:rPr>
-              <a:t>MQTT protocol</a:t>
-            </a:r>
-          </a:p>
-          <a:p>
-            <a:pPr marL="285750" indent="-285750">
-              <a:spcBef>
-                <a:spcPts val="1000"/>
-              </a:spcBef>
-              <a:buClr>
-                <a:schemeClr val="accent1"/>
-              </a:buClr>
-              <a:buSzPct val="80000"/>
-              <a:buFont typeface="Wingdings 3" charset="2"/>
-              <a:buChar char=""/>
-            </a:pPr>
-            <a:r>
-              <a:rPr lang="en-US" sz="1500" dirty="0">
-                <a:solidFill>
-                  <a:schemeClr val="tx1">
-                    <a:lumMod val="75000"/>
-                    <a:lumOff val="25000"/>
-                  </a:schemeClr>
-                </a:solidFill>
-              </a:rPr>
-              <a:t>Eclipse </a:t>
-            </a:r>
-            <a:r>
-              <a:rPr lang="en-US" sz="1500" dirty="0" err="1">
-                <a:solidFill>
-                  <a:schemeClr val="tx1">
-                    <a:lumMod val="75000"/>
-                    <a:lumOff val="25000"/>
-                  </a:schemeClr>
-                </a:solidFill>
-              </a:rPr>
-              <a:t>Mosquitto</a:t>
-            </a:r>
-            <a:r>
-              <a:rPr lang="en-US" sz="1500" dirty="0">
-                <a:solidFill>
-                  <a:schemeClr val="tx1">
-                    <a:lumMod val="75000"/>
-                    <a:lumOff val="25000"/>
-                  </a:schemeClr>
-                </a:solidFill>
-              </a:rPr>
-              <a:t> MQTT Broker</a:t>
+              <a:t>Azure App service will host the Web Application</a:t>
             </a:r>
           </a:p>
         </p:txBody>
       </p:sp>
       <p:pic>
         <p:nvPicPr>
-          <p:cNvPr id="7" name="Segnaposto contenuto 6">
+          <p:cNvPr id="9" name="Picture 4" descr="Diagram">
             <a:extLst>
               <a:ext uri="{FF2B5EF4-FFF2-40B4-BE49-F238E27FC236}">
-                <a16:creationId xmlns:a16="http://schemas.microsoft.com/office/drawing/2014/main" id="{A127DB2F-2E16-4F67-AA8E-68E1A8F6CAE1}"/>
+                <a16:creationId xmlns:a16="http://schemas.microsoft.com/office/drawing/2014/main" id="{65092BC2-FCEF-438A-84E8-86ADC2F8EFA0}"/>
               </a:ext>
             </a:extLst>
           </p:cNvPr>
           <p:cNvPicPr>
-            <a:picLocks noGrp="1" noChangeAspect="1"/>
+            <a:picLocks noGrp="1" noChangeAspect="1" noChangeArrowheads="1"/>
           </p:cNvPicPr>
           <p:nvPr>
             <p:ph idx="1"/>
           </p:nvPr>
         </p:nvPicPr>
         <p:blipFill>
-          <a:blip r:embed="rId2"/>
+          <a:blip r:embed="rId2">
+            <a:extLst>
+              <a:ext uri="{28A0092B-C50C-407E-A947-70E740481C1C}">
+                <a14:useLocalDpi xmlns:a14="http://schemas.microsoft.com/office/drawing/2010/main" val="0"/>
+              </a:ext>
+            </a:extLst>
+          </a:blip>
+          <a:srcRect/>
           <a:stretch>
             <a:fillRect/>
           </a:stretch>
         </p:blipFill>
-        <p:spPr>
+        <p:spPr bwMode="auto">
           <a:xfrm>
-            <a:off x="875606" y="1488281"/>
-            <a:ext cx="3023708" cy="3881437"/>
+            <a:off x="832505" y="1744968"/>
+            <a:ext cx="8596312" cy="2614935"/>
           </a:xfrm>
           <a:prstGeom prst="rect">
             <a:avLst/>
           </a:prstGeom>
+          <a:noFill/>
+          <a:extLst>
+            <a:ext uri="{909E8E84-426E-40DD-AFC4-6F175D3DCCD1}">
+              <a14:hiddenFill xmlns:a14="http://schemas.microsoft.com/office/drawing/2010/main">
+                <a:solidFill>
+                  <a:srgbClr val="FFFFFF"/>
+                </a:solidFill>
+              </a14:hiddenFill>
+            </a:ext>
+          </a:extLst>
         </p:spPr>
       </p:pic>
     </p:spTree>
     <p:extLst>
       <p:ext uri="{BB962C8B-B14F-4D97-AF65-F5344CB8AC3E}">
-        <p14:creationId xmlns:p14="http://schemas.microsoft.com/office/powerpoint/2010/main" val="883328262"/>
+        <p14:creationId xmlns:p14="http://schemas.microsoft.com/office/powerpoint/2010/main" val="2700214732"/>
       </p:ext>
     </p:extLst>
   </p:cSld>
@@ -8309,14 +8405,6 @@
 <file path=ppt/slides/slide19.xml><?xml version="1.0" encoding="utf-8"?>
 <p:sld xmlns:a="http://schemas.openxmlformats.org/drawingml/2006/main" xmlns:r="http://schemas.openxmlformats.org/officeDocument/2006/relationships" xmlns:p="http://schemas.openxmlformats.org/presentationml/2006/main">
   <p:cSld>
-    <p:bg>
-      <p:bgPr>
-        <a:solidFill>
-          <a:schemeClr val="bg1"/>
-        </a:solidFill>
-        <a:effectLst/>
-      </p:bgPr>
-    </p:bg>
     <p:spTree>
       <p:nvGrpSpPr>
         <p:cNvPr id="1" name=""/>
@@ -8336,7 +8424,7 @@
           <p:cNvPr id="2" name="Titolo 1">
             <a:extLst>
               <a:ext uri="{FF2B5EF4-FFF2-40B4-BE49-F238E27FC236}">
-                <a16:creationId xmlns:a16="http://schemas.microsoft.com/office/drawing/2014/main" id="{A1169DF2-87A9-4375-91BC-87D5EC2C6A12}"/>
+                <a16:creationId xmlns:a16="http://schemas.microsoft.com/office/drawing/2014/main" id="{1593C526-DA35-4572-872A-E945DE7AA940}"/>
               </a:ext>
             </a:extLst>
           </p:cNvPr>
@@ -8347,188 +8435,120 @@
             <p:ph type="title"/>
           </p:nvPr>
         </p:nvSpPr>
+        <p:spPr/>
+        <p:txBody>
+          <a:bodyPr/>
+          <a:lstStyle/>
+          <a:p>
+            <a:pPr algn="ctr"/>
+            <a:r>
+              <a:rPr lang="en-US" dirty="0"/>
+              <a:t>Technical </a:t>
+            </a:r>
+            <a:r>
+              <a:rPr lang="it-IT" dirty="0"/>
+              <a:t>work </a:t>
+            </a:r>
+            <a:r>
+              <a:rPr lang="it-IT" dirty="0" err="1"/>
+              <a:t>done</a:t>
+            </a:r>
+            <a:r>
+              <a:rPr lang="it-IT" dirty="0"/>
+              <a:t> so far</a:t>
+            </a:r>
+            <a:br>
+              <a:rPr lang="en-US" dirty="0"/>
+            </a:br>
+            <a:endParaRPr lang="en-US" dirty="0"/>
+          </a:p>
+        </p:txBody>
+      </p:sp>
+      <p:sp>
+        <p:nvSpPr>
+          <p:cNvPr id="3" name="Segnaposto contenuto 2">
+            <a:extLst>
+              <a:ext uri="{FF2B5EF4-FFF2-40B4-BE49-F238E27FC236}">
+                <a16:creationId xmlns:a16="http://schemas.microsoft.com/office/drawing/2014/main" id="{892AB52C-EEA5-4146-BB11-BC81A219A805}"/>
+              </a:ext>
+            </a:extLst>
+          </p:cNvPr>
+          <p:cNvSpPr>
+            <a:spLocks noGrp="1"/>
+          </p:cNvSpPr>
+          <p:nvPr>
+            <p:ph idx="1"/>
+          </p:nvPr>
+        </p:nvSpPr>
         <p:spPr>
           <a:xfrm>
-            <a:off x="677334" y="609600"/>
-            <a:ext cx="8596668" cy="1320800"/>
+            <a:off x="677333" y="1727452"/>
+            <a:ext cx="9208875" cy="3880773"/>
           </a:xfrm>
         </p:spPr>
         <p:txBody>
-          <a:bodyPr vert="horz" lIns="91440" tIns="45720" rIns="91440" bIns="45720" rtlCol="0" anchor="t">
+          <a:bodyPr>
             <a:normAutofit/>
           </a:bodyPr>
           <a:lstStyle/>
           <a:p>
-            <a:r>
-              <a:rPr lang="en-US"/>
-              <a:t>Cloud Services</a:t>
-            </a:r>
-          </a:p>
-        </p:txBody>
-      </p:sp>
-      <p:sp>
-        <p:nvSpPr>
-          <p:cNvPr id="4" name="CasellaDiTesto 3">
-            <a:extLst>
-              <a:ext uri="{FF2B5EF4-FFF2-40B4-BE49-F238E27FC236}">
-                <a16:creationId xmlns:a16="http://schemas.microsoft.com/office/drawing/2014/main" id="{72D8A3AA-4D53-4451-8078-37D5402C2824}"/>
-              </a:ext>
-            </a:extLst>
-          </p:cNvPr>
-          <p:cNvSpPr txBox="1"/>
-          <p:nvPr/>
-        </p:nvSpPr>
-        <p:spPr>
-          <a:xfrm>
-            <a:off x="6481461" y="4835295"/>
-            <a:ext cx="2927185" cy="3880773"/>
-          </a:xfrm>
-          <a:prstGeom prst="rect">
-            <a:avLst/>
-          </a:prstGeom>
-        </p:spPr>
-        <p:txBody>
-          <a:bodyPr vert="horz" lIns="91440" tIns="45720" rIns="91440" bIns="45720" rtlCol="0">
-            <a:normAutofit/>
-          </a:bodyPr>
-          <a:lstStyle/>
-          <a:p>
-            <a:pPr marL="285750" indent="-285750">
-              <a:spcBef>
-                <a:spcPts val="1000"/>
-              </a:spcBef>
-              <a:buClr>
-                <a:schemeClr val="accent1"/>
-              </a:buClr>
-              <a:buSzPct val="80000"/>
-              <a:buFont typeface="Wingdings 3" charset="2"/>
-              <a:buChar char=""/>
+            <a:pPr marL="0" indent="0">
+              <a:buNone/>
             </a:pPr>
             <a:r>
-              <a:rPr lang="en-US" sz="1500" dirty="0">
-                <a:solidFill>
-                  <a:schemeClr val="tx1">
-                    <a:lumMod val="75000"/>
-                    <a:lumOff val="25000"/>
-                  </a:schemeClr>
-                </a:solidFill>
-              </a:rPr>
-              <a:t>Azure Cloud services</a:t>
-            </a:r>
-          </a:p>
-          <a:p>
-            <a:pPr marL="742950" lvl="1" indent="-285750">
-              <a:spcBef>
-                <a:spcPts val="1000"/>
-              </a:spcBef>
-              <a:buClr>
-                <a:schemeClr val="accent1"/>
-              </a:buClr>
-              <a:buSzPct val="80000"/>
-              <a:buFont typeface="Wingdings 3" charset="2"/>
-              <a:buChar char=""/>
+              <a:rPr lang="en-US" sz="1600" dirty="0"/>
+              <a:t>Our work, from a technical point of view up to now is:</a:t>
+            </a:r>
+          </a:p>
+          <a:p>
+            <a:pPr>
+              <a:buFont typeface="+mj-lt"/>
+              <a:buAutoNum type="arabicPeriod"/>
             </a:pPr>
             <a:r>
-              <a:rPr lang="en-US" sz="1500" dirty="0">
-                <a:solidFill>
-                  <a:schemeClr val="tx1">
-                    <a:lumMod val="75000"/>
-                    <a:lumOff val="25000"/>
-                  </a:schemeClr>
-                </a:solidFill>
-              </a:rPr>
-              <a:t>Azure Function</a:t>
-            </a:r>
-          </a:p>
-          <a:p>
-            <a:pPr marL="742950" lvl="1" indent="-285750">
-              <a:spcBef>
-                <a:spcPts val="1000"/>
-              </a:spcBef>
-              <a:buClr>
-                <a:schemeClr val="accent1"/>
-              </a:buClr>
-              <a:buSzPct val="80000"/>
-              <a:buFont typeface="Wingdings 3" charset="2"/>
-              <a:buChar char=""/>
+              <a:rPr lang="en-US" sz="1600" dirty="0"/>
+              <a:t>We have implemented the cloud infrastructure to make the system work:</a:t>
+            </a:r>
+          </a:p>
+          <a:p>
+            <a:pPr marL="857250" lvl="1" indent="-400050">
+              <a:buFont typeface="+mj-lt"/>
+              <a:buAutoNum type="romanLcPeriod"/>
             </a:pPr>
             <a:r>
-              <a:rPr lang="en-US" sz="1500" dirty="0">
-                <a:solidFill>
-                  <a:schemeClr val="tx1">
-                    <a:lumMod val="75000"/>
-                    <a:lumOff val="25000"/>
-                  </a:schemeClr>
-                </a:solidFill>
-              </a:rPr>
-              <a:t>Azure IoT Hub</a:t>
-            </a:r>
-          </a:p>
-          <a:p>
-            <a:pPr marL="742950" lvl="1" indent="-285750">
-              <a:spcBef>
-                <a:spcPts val="1000"/>
-              </a:spcBef>
-              <a:buClr>
-                <a:schemeClr val="accent1"/>
-              </a:buClr>
-              <a:buSzPct val="80000"/>
-              <a:buFont typeface="Wingdings 3" charset="2"/>
-              <a:buChar char=""/>
+              <a:rPr lang="en-US" sz="1400" dirty="0"/>
+              <a:t>An SQL database with all the necessary tables to maintain useful data to be processed by our system.</a:t>
+            </a:r>
+          </a:p>
+          <a:p>
+            <a:pPr marL="857250" lvl="1" indent="-400050">
+              <a:buFont typeface="+mj-lt"/>
+              <a:buAutoNum type="romanLcPeriod"/>
             </a:pPr>
             <a:r>
-              <a:rPr lang="en-US" sz="1500" dirty="0">
-                <a:solidFill>
-                  <a:schemeClr val="tx1">
-                    <a:lumMod val="75000"/>
-                    <a:lumOff val="25000"/>
-                  </a:schemeClr>
-                </a:solidFill>
-              </a:rPr>
-              <a:t>Azure SQL DB</a:t>
-            </a:r>
-          </a:p>
-        </p:txBody>
-      </p:sp>
-      <p:pic>
-        <p:nvPicPr>
-          <p:cNvPr id="8" name="Segnaposto contenuto 7">
-            <a:extLst>
-              <a:ext uri="{FF2B5EF4-FFF2-40B4-BE49-F238E27FC236}">
-                <a16:creationId xmlns:a16="http://schemas.microsoft.com/office/drawing/2014/main" id="{31341ABE-CC58-492C-82F9-18886BB441B0}"/>
-              </a:ext>
-            </a:extLst>
-          </p:cNvPr>
-          <p:cNvPicPr>
-            <a:picLocks noGrp="1" noChangeAspect="1"/>
-          </p:cNvPicPr>
-          <p:nvPr>
-            <p:ph idx="1"/>
-          </p:nvPr>
-        </p:nvPicPr>
-        <p:blipFill>
-          <a:blip r:embed="rId2">
-            <a:extLst>
-              <a:ext uri="{28A0092B-C50C-407E-A947-70E740481C1C}">
-                <a14:useLocalDpi xmlns:a14="http://schemas.microsoft.com/office/drawing/2010/main" val="0"/>
-              </a:ext>
-            </a:extLst>
-          </a:blip>
-          <a:stretch>
-            <a:fillRect/>
-          </a:stretch>
-        </p:blipFill>
-        <p:spPr>
-          <a:xfrm>
-            <a:off x="812334" y="1607752"/>
-            <a:ext cx="8596312" cy="2822130"/>
-          </a:xfrm>
-        </p:spPr>
-      </p:pic>
+              <a:rPr lang="en-US" sz="1400" dirty="0"/>
+              <a:t>We implemented a scoring algorithm that takes into account the similarity between recent visits and the current visit, and the number of people that is currently in each section.</a:t>
+            </a:r>
+          </a:p>
+          <a:p>
+            <a:pPr>
+              <a:buFont typeface="+mj-lt"/>
+              <a:buAutoNum type="arabicPeriod"/>
+            </a:pPr>
+            <a:r>
+              <a:rPr lang="en-US" sz="1600" dirty="0"/>
+              <a:t>We have a starting version of the web application that gives suggestion about the next room to visit, taking into account the taste of the visitor and the crowding situation in each section.</a:t>
+            </a:r>
+          </a:p>
+          <a:p>
+            <a:endParaRPr lang="en-US" dirty="0"/>
+          </a:p>
+        </p:txBody>
+      </p:sp>
     </p:spTree>
     <p:extLst>
       <p:ext uri="{BB962C8B-B14F-4D97-AF65-F5344CB8AC3E}">
-        <p14:creationId xmlns:p14="http://schemas.microsoft.com/office/powerpoint/2010/main" val="2727602274"/>
+        <p14:creationId xmlns:p14="http://schemas.microsoft.com/office/powerpoint/2010/main" val="3166055417"/>
       </p:ext>
     </p:extLst>
   </p:cSld>
@@ -8768,14 +8788,6 @@
 <file path=ppt/slides/slide20.xml><?xml version="1.0" encoding="utf-8"?>
 <p:sld xmlns:a="http://schemas.openxmlformats.org/drawingml/2006/main" xmlns:r="http://schemas.openxmlformats.org/officeDocument/2006/relationships" xmlns:p="http://schemas.openxmlformats.org/presentationml/2006/main">
   <p:cSld>
-    <p:bg>
-      <p:bgPr>
-        <a:solidFill>
-          <a:schemeClr val="bg1"/>
-        </a:solidFill>
-        <a:effectLst/>
-      </p:bgPr>
-    </p:bg>
     <p:spTree>
       <p:nvGrpSpPr>
         <p:cNvPr id="1" name=""/>
@@ -8795,7 +8807,7 @@
           <p:cNvPr id="2" name="Titolo 1">
             <a:extLst>
               <a:ext uri="{FF2B5EF4-FFF2-40B4-BE49-F238E27FC236}">
-                <a16:creationId xmlns:a16="http://schemas.microsoft.com/office/drawing/2014/main" id="{6E26A17A-2562-4957-80E5-96961E3462A0}"/>
+                <a16:creationId xmlns:a16="http://schemas.microsoft.com/office/drawing/2014/main" id="{206D8463-2638-4CE7-88DE-05B727FE4DB8}"/>
               </a:ext>
             </a:extLst>
           </p:cNvPr>
@@ -8803,134 +8815,34 @@
             <a:spLocks noGrp="1"/>
           </p:cNvSpPr>
           <p:nvPr>
-            <p:ph type="title"/>
-          </p:nvPr>
-        </p:nvSpPr>
-        <p:spPr>
-          <a:xfrm>
-            <a:off x="1110193" y="359436"/>
-            <a:ext cx="6591389" cy="1320800"/>
-          </a:xfrm>
-        </p:spPr>
-        <p:txBody>
-          <a:bodyPr vert="horz" lIns="91440" tIns="45720" rIns="91440" bIns="45720" rtlCol="0" anchor="ctr">
-            <a:normAutofit/>
-          </a:bodyPr>
+            <p:ph type="ctrTitle"/>
+          </p:nvPr>
+        </p:nvSpPr>
+        <p:spPr/>
+        <p:txBody>
+          <a:bodyPr/>
           <a:lstStyle/>
           <a:p>
-            <a:pPr algn="ctr"/>
+            <a:r>
+              <a:rPr lang="it-IT" dirty="0"/>
+              <a:t>To be </a:t>
+            </a:r>
             <a:r>
               <a:rPr lang="en-US" dirty="0"/>
-              <a:t>The complete flow</a:t>
-            </a:r>
-          </a:p>
-        </p:txBody>
-      </p:sp>
-      <p:sp>
-        <p:nvSpPr>
-          <p:cNvPr id="4" name="CasellaDiTesto 3">
-            <a:extLst>
-              <a:ext uri="{FF2B5EF4-FFF2-40B4-BE49-F238E27FC236}">
-                <a16:creationId xmlns:a16="http://schemas.microsoft.com/office/drawing/2014/main" id="{117390EB-2DE8-4F8E-883C-A3C63882A628}"/>
-              </a:ext>
-            </a:extLst>
-          </p:cNvPr>
-          <p:cNvSpPr txBox="1"/>
-          <p:nvPr/>
-        </p:nvSpPr>
-        <p:spPr>
-          <a:xfrm>
-            <a:off x="4405887" y="5164261"/>
-            <a:ext cx="5912224" cy="3560733"/>
-          </a:xfrm>
-          <a:prstGeom prst="rect">
-            <a:avLst/>
-          </a:prstGeom>
-        </p:spPr>
-        <p:txBody>
-          <a:bodyPr vert="horz" lIns="91440" tIns="45720" rIns="91440" bIns="45720" rtlCol="0">
-            <a:normAutofit/>
-          </a:bodyPr>
-          <a:lstStyle/>
-          <a:p>
-            <a:pPr marL="285750" indent="-285750">
-              <a:spcBef>
-                <a:spcPts val="1000"/>
-              </a:spcBef>
-              <a:buClr>
-                <a:schemeClr val="accent1"/>
-              </a:buClr>
-              <a:buSzPct val="80000"/>
-              <a:buFont typeface="Wingdings 3" charset="2"/>
-              <a:buChar char=""/>
-            </a:pPr>
-            <a:r>
-              <a:rPr lang="en-US" dirty="0">
-                <a:solidFill>
-                  <a:schemeClr val="tx1">
-                    <a:lumMod val="75000"/>
-                    <a:lumOff val="25000"/>
-                  </a:schemeClr>
-                </a:solidFill>
-              </a:rPr>
-              <a:t>Azure App service will host the Web Application</a:t>
-            </a:r>
-          </a:p>
-        </p:txBody>
-      </p:sp>
-      <p:pic>
-        <p:nvPicPr>
-          <p:cNvPr id="9" name="Picture 4" descr="Diagram">
-            <a:extLst>
-              <a:ext uri="{FF2B5EF4-FFF2-40B4-BE49-F238E27FC236}">
-                <a16:creationId xmlns:a16="http://schemas.microsoft.com/office/drawing/2014/main" id="{65092BC2-FCEF-438A-84E8-86ADC2F8EFA0}"/>
-              </a:ext>
-            </a:extLst>
-          </p:cNvPr>
-          <p:cNvPicPr>
-            <a:picLocks noGrp="1" noChangeAspect="1" noChangeArrowheads="1"/>
-          </p:cNvPicPr>
-          <p:nvPr>
-            <p:ph idx="1"/>
-          </p:nvPr>
-        </p:nvPicPr>
-        <p:blipFill>
-          <a:blip r:embed="rId2">
-            <a:extLst>
-              <a:ext uri="{28A0092B-C50C-407E-A947-70E740481C1C}">
-                <a14:useLocalDpi xmlns:a14="http://schemas.microsoft.com/office/drawing/2010/main" val="0"/>
-              </a:ext>
-            </a:extLst>
-          </a:blip>
-          <a:srcRect/>
-          <a:stretch>
-            <a:fillRect/>
-          </a:stretch>
-        </p:blipFill>
-        <p:spPr bwMode="auto">
-          <a:xfrm>
-            <a:off x="832505" y="1744968"/>
-            <a:ext cx="8596312" cy="2614935"/>
-          </a:xfrm>
-          <a:prstGeom prst="rect">
-            <a:avLst/>
-          </a:prstGeom>
-          <a:noFill/>
-          <a:extLst>
-            <a:ext uri="{909E8E84-426E-40DD-AFC4-6F175D3DCCD1}">
-              <a14:hiddenFill xmlns:a14="http://schemas.microsoft.com/office/drawing/2010/main">
-                <a:solidFill>
-                  <a:srgbClr val="FFFFFF"/>
-                </a:solidFill>
-              </a14:hiddenFill>
-            </a:ext>
-          </a:extLst>
-        </p:spPr>
-      </p:pic>
+              <a:t>done</a:t>
+            </a:r>
+            <a:r>
+              <a:rPr lang="it-IT" dirty="0"/>
+              <a:t> </a:t>
+            </a:r>
+            <a:endParaRPr lang="en-US" dirty="0"/>
+          </a:p>
+        </p:txBody>
+      </p:sp>
     </p:spTree>
     <p:extLst>
       <p:ext uri="{BB962C8B-B14F-4D97-AF65-F5344CB8AC3E}">
-        <p14:creationId xmlns:p14="http://schemas.microsoft.com/office/powerpoint/2010/main" val="2700214732"/>
+        <p14:creationId xmlns:p14="http://schemas.microsoft.com/office/powerpoint/2010/main" val="958762047"/>
       </p:ext>
     </p:extLst>
   </p:cSld>
@@ -8941,6 +8853,560 @@
 </file>
 
 <file path=ppt/slides/slide21.xml><?xml version="1.0" encoding="utf-8"?>
+<p:sld xmlns:a="http://schemas.openxmlformats.org/drawingml/2006/main" xmlns:r="http://schemas.openxmlformats.org/officeDocument/2006/relationships" xmlns:p="http://schemas.openxmlformats.org/presentationml/2006/main">
+  <p:cSld>
+    <p:spTree>
+      <p:nvGrpSpPr>
+        <p:cNvPr id="1" name=""/>
+        <p:cNvGrpSpPr/>
+        <p:nvPr/>
+      </p:nvGrpSpPr>
+      <p:grpSpPr>
+        <a:xfrm>
+          <a:off x="0" y="0"/>
+          <a:ext cx="0" cy="0"/>
+          <a:chOff x="0" y="0"/>
+          <a:chExt cx="0" cy="0"/>
+        </a:xfrm>
+      </p:grpSpPr>
+      <p:sp>
+        <p:nvSpPr>
+          <p:cNvPr id="2" name="Titolo 1">
+            <a:extLst>
+              <a:ext uri="{FF2B5EF4-FFF2-40B4-BE49-F238E27FC236}">
+                <a16:creationId xmlns:a16="http://schemas.microsoft.com/office/drawing/2014/main" id="{1593C526-DA35-4572-872A-E945DE7AA940}"/>
+              </a:ext>
+            </a:extLst>
+          </p:cNvPr>
+          <p:cNvSpPr>
+            <a:spLocks noGrp="1"/>
+          </p:cNvSpPr>
+          <p:nvPr>
+            <p:ph type="title"/>
+          </p:nvPr>
+        </p:nvSpPr>
+        <p:spPr>
+          <a:xfrm>
+            <a:off x="677334" y="609600"/>
+            <a:ext cx="8596668" cy="1011382"/>
+          </a:xfrm>
+        </p:spPr>
+        <p:txBody>
+          <a:bodyPr>
+            <a:noAutofit/>
+          </a:bodyPr>
+          <a:lstStyle/>
+          <a:p>
+            <a:pPr algn="ctr"/>
+            <a:r>
+              <a:rPr lang="it-IT" dirty="0"/>
+              <a:t>Technical work for the last delivery</a:t>
+            </a:r>
+            <a:br>
+              <a:rPr lang="en-US" dirty="0"/>
+            </a:br>
+            <a:endParaRPr lang="en-US" dirty="0"/>
+          </a:p>
+        </p:txBody>
+      </p:sp>
+      <p:sp>
+        <p:nvSpPr>
+          <p:cNvPr id="5" name="Segnaposto contenuto 4">
+            <a:extLst>
+              <a:ext uri="{FF2B5EF4-FFF2-40B4-BE49-F238E27FC236}">
+                <a16:creationId xmlns:a16="http://schemas.microsoft.com/office/drawing/2014/main" id="{A9D7A1BE-38EF-485B-BEEA-442A52CED413}"/>
+              </a:ext>
+            </a:extLst>
+          </p:cNvPr>
+          <p:cNvSpPr>
+            <a:spLocks noGrp="1"/>
+          </p:cNvSpPr>
+          <p:nvPr>
+            <p:ph idx="1"/>
+          </p:nvPr>
+        </p:nvSpPr>
+        <p:spPr>
+          <a:xfrm>
+            <a:off x="677334" y="2160589"/>
+            <a:ext cx="8662609" cy="3880773"/>
+          </a:xfrm>
+        </p:spPr>
+        <p:txBody>
+          <a:bodyPr/>
+          <a:lstStyle/>
+          <a:p>
+            <a:pPr>
+              <a:buFont typeface="+mj-lt"/>
+              <a:buAutoNum type="arabicPeriod"/>
+            </a:pPr>
+            <a:r>
+              <a:rPr lang="en-US" sz="1600" dirty="0"/>
+              <a:t>The boards in our future plans have to communicate to reach a consensus about the final list of devices in each section, moreover they have to send this list to the cloud.</a:t>
+            </a:r>
+          </a:p>
+          <a:p>
+            <a:pPr>
+              <a:buFont typeface="+mj-lt"/>
+              <a:buAutoNum type="arabicPeriod"/>
+            </a:pPr>
+            <a:r>
+              <a:rPr lang="en-US" sz="1600" dirty="0"/>
+              <a:t>We do not know if the board can handle this load. Otherwise the computation will be done using the computational power of the cloud as we do now.</a:t>
+            </a:r>
+          </a:p>
+        </p:txBody>
+      </p:sp>
+    </p:spTree>
+    <p:extLst>
+      <p:ext uri="{BB962C8B-B14F-4D97-AF65-F5344CB8AC3E}">
+        <p14:creationId xmlns:p14="http://schemas.microsoft.com/office/powerpoint/2010/main" val="75929822"/>
+      </p:ext>
+    </p:extLst>
+  </p:cSld>
+  <p:clrMapOvr>
+    <a:masterClrMapping/>
+  </p:clrMapOvr>
+</p:sld>
+</file>
+
+<file path=ppt/slides/slide22.xml><?xml version="1.0" encoding="utf-8"?>
+<p:sld xmlns:a="http://schemas.openxmlformats.org/drawingml/2006/main" xmlns:r="http://schemas.openxmlformats.org/officeDocument/2006/relationships" xmlns:p="http://schemas.openxmlformats.org/presentationml/2006/main">
+  <p:cSld>
+    <p:spTree>
+      <p:nvGrpSpPr>
+        <p:cNvPr id="1" name=""/>
+        <p:cNvGrpSpPr/>
+        <p:nvPr/>
+      </p:nvGrpSpPr>
+      <p:grpSpPr>
+        <a:xfrm>
+          <a:off x="0" y="0"/>
+          <a:ext cx="0" cy="0"/>
+          <a:chOff x="0" y="0"/>
+          <a:chExt cx="0" cy="0"/>
+        </a:xfrm>
+      </p:grpSpPr>
+      <p:sp>
+        <p:nvSpPr>
+          <p:cNvPr id="2" name="Titolo 1">
+            <a:extLst>
+              <a:ext uri="{FF2B5EF4-FFF2-40B4-BE49-F238E27FC236}">
+                <a16:creationId xmlns:a16="http://schemas.microsoft.com/office/drawing/2014/main" id="{1593C526-DA35-4572-872A-E945DE7AA940}"/>
+              </a:ext>
+            </a:extLst>
+          </p:cNvPr>
+          <p:cNvSpPr>
+            <a:spLocks noGrp="1"/>
+          </p:cNvSpPr>
+          <p:nvPr>
+            <p:ph type="title"/>
+          </p:nvPr>
+        </p:nvSpPr>
+        <p:spPr>
+          <a:xfrm>
+            <a:off x="677334" y="609600"/>
+            <a:ext cx="8596668" cy="1011382"/>
+          </a:xfrm>
+        </p:spPr>
+        <p:txBody>
+          <a:bodyPr>
+            <a:noAutofit/>
+          </a:bodyPr>
+          <a:lstStyle/>
+          <a:p>
+            <a:pPr algn="ctr"/>
+            <a:r>
+              <a:rPr lang="it-IT" dirty="0"/>
+              <a:t>Evaluation for the last delivery</a:t>
+            </a:r>
+            <a:br>
+              <a:rPr lang="en-US" dirty="0"/>
+            </a:br>
+            <a:endParaRPr lang="en-US" dirty="0"/>
+          </a:p>
+        </p:txBody>
+      </p:sp>
+      <p:sp>
+        <p:nvSpPr>
+          <p:cNvPr id="5" name="Segnaposto contenuto 4">
+            <a:extLst>
+              <a:ext uri="{FF2B5EF4-FFF2-40B4-BE49-F238E27FC236}">
+                <a16:creationId xmlns:a16="http://schemas.microsoft.com/office/drawing/2014/main" id="{A9D7A1BE-38EF-485B-BEEA-442A52CED413}"/>
+              </a:ext>
+            </a:extLst>
+          </p:cNvPr>
+          <p:cNvSpPr>
+            <a:spLocks noGrp="1"/>
+          </p:cNvSpPr>
+          <p:nvPr>
+            <p:ph idx="1"/>
+          </p:nvPr>
+        </p:nvSpPr>
+        <p:spPr>
+          <a:xfrm>
+            <a:off x="677334" y="2160589"/>
+            <a:ext cx="8662609" cy="3880773"/>
+          </a:xfrm>
+        </p:spPr>
+        <p:txBody>
+          <a:bodyPr/>
+          <a:lstStyle/>
+          <a:p>
+            <a:pPr>
+              <a:buFont typeface="+mj-lt"/>
+              <a:buAutoNum type="arabicPeriod"/>
+            </a:pPr>
+            <a:r>
+              <a:rPr lang="en-US" sz="1600" dirty="0"/>
+              <a:t>We have to test whether our cloud architecture is efficient enough for our purposes, our target remains to manage 20 devices per room. </a:t>
+            </a:r>
+          </a:p>
+          <a:p>
+            <a:pPr lvl="1">
+              <a:buFont typeface="+mj-lt"/>
+              <a:buAutoNum type="arabicPeriod"/>
+            </a:pPr>
+            <a:r>
+              <a:rPr lang="en-US" sz="1400" dirty="0"/>
+              <a:t>So we will perform a simulation, through a Python script, sending data to the cloud and analyzing the behavior of our algorithm, taking into account that saving data to the DB, from what we have experienced so far, is an important bottleneck</a:t>
+            </a:r>
+          </a:p>
+          <a:p>
+            <a:pPr>
+              <a:buFont typeface="+mj-lt"/>
+              <a:buAutoNum type="arabicPeriod"/>
+            </a:pPr>
+            <a:r>
+              <a:rPr lang="en-US" sz="1600" dirty="0"/>
+              <a:t>Evaluation of MQTT (we have to repeat a similar experiment using MQTT)</a:t>
+            </a:r>
+          </a:p>
+        </p:txBody>
+      </p:sp>
+    </p:spTree>
+    <p:extLst>
+      <p:ext uri="{BB962C8B-B14F-4D97-AF65-F5344CB8AC3E}">
+        <p14:creationId xmlns:p14="http://schemas.microsoft.com/office/powerpoint/2010/main" val="3575856743"/>
+      </p:ext>
+    </p:extLst>
+  </p:cSld>
+  <p:clrMapOvr>
+    <a:masterClrMapping/>
+  </p:clrMapOvr>
+</p:sld>
+</file>
+
+<file path=ppt/slides/slide23.xml><?xml version="1.0" encoding="utf-8"?>
+<p:sld xmlns:a="http://schemas.openxmlformats.org/drawingml/2006/main" xmlns:r="http://schemas.openxmlformats.org/officeDocument/2006/relationships" xmlns:p="http://schemas.openxmlformats.org/presentationml/2006/main">
+  <p:cSld>
+    <p:spTree>
+      <p:nvGrpSpPr>
+        <p:cNvPr id="1" name=""/>
+        <p:cNvGrpSpPr/>
+        <p:nvPr/>
+      </p:nvGrpSpPr>
+      <p:grpSpPr>
+        <a:xfrm>
+          <a:off x="0" y="0"/>
+          <a:ext cx="0" cy="0"/>
+          <a:chOff x="0" y="0"/>
+          <a:chExt cx="0" cy="0"/>
+        </a:xfrm>
+      </p:grpSpPr>
+      <p:sp>
+        <p:nvSpPr>
+          <p:cNvPr id="2" name="Titolo 1">
+            <a:extLst>
+              <a:ext uri="{FF2B5EF4-FFF2-40B4-BE49-F238E27FC236}">
+                <a16:creationId xmlns:a16="http://schemas.microsoft.com/office/drawing/2014/main" id="{21FB7D41-B0F3-43C5-B5BF-6822A7CDCF4E}"/>
+              </a:ext>
+            </a:extLst>
+          </p:cNvPr>
+          <p:cNvSpPr>
+            <a:spLocks noGrp="1"/>
+          </p:cNvSpPr>
+          <p:nvPr>
+            <p:ph type="title"/>
+          </p:nvPr>
+        </p:nvSpPr>
+        <p:spPr/>
+        <p:txBody>
+          <a:bodyPr/>
+          <a:lstStyle/>
+          <a:p>
+            <a:pPr algn="ctr"/>
+            <a:r>
+              <a:rPr lang="it-IT" dirty="0"/>
+              <a:t>User Experience Evaluation</a:t>
+            </a:r>
+          </a:p>
+        </p:txBody>
+      </p:sp>
+      <p:sp>
+        <p:nvSpPr>
+          <p:cNvPr id="7" name="Segnaposto contenuto 6">
+            <a:extLst>
+              <a:ext uri="{FF2B5EF4-FFF2-40B4-BE49-F238E27FC236}">
+                <a16:creationId xmlns:a16="http://schemas.microsoft.com/office/drawing/2014/main" id="{02492732-561D-4081-A250-6628D2C8DB74}"/>
+              </a:ext>
+            </a:extLst>
+          </p:cNvPr>
+          <p:cNvSpPr>
+            <a:spLocks noGrp="1"/>
+          </p:cNvSpPr>
+          <p:nvPr>
+            <p:ph idx="1"/>
+          </p:nvPr>
+        </p:nvSpPr>
+        <p:spPr/>
+        <p:txBody>
+          <a:bodyPr/>
+          <a:lstStyle/>
+          <a:p>
+            <a:r>
+              <a:rPr lang="en-US" dirty="0"/>
+              <a:t>We are planning evaluate the user experience using mockups, and after every demo of these prototypes we will collect people's opinions asking for feedbacks and publishing some google forms.</a:t>
+            </a:r>
+          </a:p>
+          <a:p>
+            <a:r>
+              <a:rPr lang="en-US" dirty="0"/>
+              <a:t>The questions will be mainly on:</a:t>
+            </a:r>
+          </a:p>
+          <a:p>
+            <a:pPr lvl="1">
+              <a:buFont typeface="Arial" panose="020B0604020202020204" pitchFamily="34" charset="0"/>
+              <a:buChar char="•"/>
+            </a:pPr>
+            <a:r>
+              <a:rPr lang="en-US" dirty="0"/>
+              <a:t>User interface</a:t>
+            </a:r>
+          </a:p>
+          <a:p>
+            <a:pPr lvl="1">
+              <a:buFont typeface="Arial" panose="020B0604020202020204" pitchFamily="34" charset="0"/>
+              <a:buChar char="•"/>
+            </a:pPr>
+            <a:r>
+              <a:rPr lang="en-US" dirty="0"/>
+              <a:t>Application services</a:t>
+            </a:r>
+            <a:endParaRPr lang="it-IT" dirty="0"/>
+          </a:p>
+        </p:txBody>
+      </p:sp>
+    </p:spTree>
+    <p:extLst>
+      <p:ext uri="{BB962C8B-B14F-4D97-AF65-F5344CB8AC3E}">
+        <p14:creationId xmlns:p14="http://schemas.microsoft.com/office/powerpoint/2010/main" val="1327256278"/>
+      </p:ext>
+    </p:extLst>
+  </p:cSld>
+  <p:clrMapOvr>
+    <a:masterClrMapping/>
+  </p:clrMapOvr>
+</p:sld>
+</file>
+
+<file path=ppt/slides/slide24.xml><?xml version="1.0" encoding="utf-8"?>
+<p:sld xmlns:a="http://schemas.openxmlformats.org/drawingml/2006/main" xmlns:r="http://schemas.openxmlformats.org/officeDocument/2006/relationships" xmlns:p="http://schemas.openxmlformats.org/presentationml/2006/main">
+  <p:cSld>
+    <p:spTree>
+      <p:nvGrpSpPr>
+        <p:cNvPr id="1" name=""/>
+        <p:cNvGrpSpPr/>
+        <p:nvPr/>
+      </p:nvGrpSpPr>
+      <p:grpSpPr>
+        <a:xfrm>
+          <a:off x="0" y="0"/>
+          <a:ext cx="0" cy="0"/>
+          <a:chOff x="0" y="0"/>
+          <a:chExt cx="0" cy="0"/>
+        </a:xfrm>
+      </p:grpSpPr>
+      <p:sp>
+        <p:nvSpPr>
+          <p:cNvPr id="2" name="Titolo 1">
+            <a:extLst>
+              <a:ext uri="{FF2B5EF4-FFF2-40B4-BE49-F238E27FC236}">
+                <a16:creationId xmlns:a16="http://schemas.microsoft.com/office/drawing/2014/main" id="{11328D87-1E1B-428D-A8F9-376F5E4F4F66}"/>
+              </a:ext>
+            </a:extLst>
+          </p:cNvPr>
+          <p:cNvSpPr>
+            <a:spLocks noGrp="1"/>
+          </p:cNvSpPr>
+          <p:nvPr>
+            <p:ph type="title"/>
+          </p:nvPr>
+        </p:nvSpPr>
+        <p:spPr/>
+        <p:txBody>
+          <a:bodyPr/>
+          <a:lstStyle/>
+          <a:p>
+            <a:pPr algn="ctr"/>
+            <a:r>
+              <a:rPr lang="it-IT" dirty="0"/>
+              <a:t>Technical Evaluation</a:t>
+            </a:r>
+          </a:p>
+        </p:txBody>
+      </p:sp>
+      <p:sp>
+        <p:nvSpPr>
+          <p:cNvPr id="3" name="Segnaposto contenuto 2">
+            <a:extLst>
+              <a:ext uri="{FF2B5EF4-FFF2-40B4-BE49-F238E27FC236}">
+                <a16:creationId xmlns:a16="http://schemas.microsoft.com/office/drawing/2014/main" id="{94146EE0-BFD9-4D7A-8828-8629B6A54869}"/>
+              </a:ext>
+            </a:extLst>
+          </p:cNvPr>
+          <p:cNvSpPr>
+            <a:spLocks noGrp="1"/>
+          </p:cNvSpPr>
+          <p:nvPr>
+            <p:ph idx="1"/>
+          </p:nvPr>
+        </p:nvSpPr>
+        <p:spPr/>
+        <p:txBody>
+          <a:bodyPr/>
+          <a:lstStyle/>
+          <a:p>
+            <a:r>
+              <a:rPr lang="it-IT" dirty="0" err="1"/>
+              <a:t>We</a:t>
+            </a:r>
+            <a:r>
+              <a:rPr lang="it-IT" dirty="0"/>
+              <a:t> </a:t>
+            </a:r>
+            <a:r>
+              <a:rPr lang="it-IT" dirty="0" err="1"/>
+              <a:t>will</a:t>
+            </a:r>
+            <a:r>
+              <a:rPr lang="it-IT" dirty="0"/>
+              <a:t> do a technical </a:t>
+            </a:r>
+            <a:r>
+              <a:rPr lang="it-IT" dirty="0" err="1"/>
+              <a:t>evaluation</a:t>
+            </a:r>
+            <a:r>
+              <a:rPr lang="it-IT" dirty="0"/>
+              <a:t> </a:t>
+            </a:r>
+            <a:r>
+              <a:rPr lang="en-US" dirty="0"/>
+              <a:t>performing</a:t>
+            </a:r>
+            <a:r>
+              <a:rPr lang="it-IT" dirty="0"/>
+              <a:t> </a:t>
+            </a:r>
+            <a:r>
+              <a:rPr lang="it-IT" dirty="0" err="1"/>
+              <a:t>load</a:t>
+            </a:r>
+            <a:r>
+              <a:rPr lang="it-IT" dirty="0"/>
+              <a:t> </a:t>
+            </a:r>
+            <a:r>
+              <a:rPr lang="it-IT" dirty="0" err="1"/>
+              <a:t>tests</a:t>
+            </a:r>
+            <a:r>
+              <a:rPr lang="it-IT" dirty="0"/>
+              <a:t> on </a:t>
+            </a:r>
+            <a:r>
+              <a:rPr lang="it-IT" dirty="0" err="1"/>
+              <a:t>all</a:t>
+            </a:r>
+            <a:r>
+              <a:rPr lang="it-IT" dirty="0"/>
+              <a:t> parts of </a:t>
+            </a:r>
+            <a:r>
+              <a:rPr lang="it-IT" dirty="0" err="1"/>
+              <a:t>our</a:t>
+            </a:r>
+            <a:r>
+              <a:rPr lang="it-IT" dirty="0"/>
+              <a:t> system:</a:t>
+            </a:r>
+          </a:p>
+          <a:p>
+            <a:pPr lvl="1">
+              <a:buFont typeface="Arial" panose="020B0604020202020204" pitchFamily="34" charset="0"/>
+              <a:buChar char="•"/>
+            </a:pPr>
+            <a:r>
+              <a:rPr lang="en-US" b="1" dirty="0"/>
+              <a:t>BLE</a:t>
+            </a:r>
+            <a:r>
+              <a:rPr lang="en-US" dirty="0"/>
+              <a:t> IoT device-Smartphone interaction: how many smartphones a single device can handle?</a:t>
+            </a:r>
+          </a:p>
+          <a:p>
+            <a:pPr lvl="1">
+              <a:buFont typeface="Arial" panose="020B0604020202020204" pitchFamily="34" charset="0"/>
+              <a:buChar char="•"/>
+            </a:pPr>
+            <a:r>
+              <a:rPr lang="en-US" b="1" dirty="0"/>
+              <a:t>Cloud</a:t>
+            </a:r>
+            <a:r>
+              <a:rPr lang="en-US" dirty="0"/>
+              <a:t> IoT device-Cloud interaction: what is the message rate with which the device can send messages to Azure IoT hub?</a:t>
+            </a:r>
+          </a:p>
+          <a:p>
+            <a:pPr lvl="1">
+              <a:buFont typeface="Arial" panose="020B0604020202020204" pitchFamily="34" charset="0"/>
+              <a:buChar char="•"/>
+            </a:pPr>
+            <a:r>
+              <a:rPr lang="en-US" b="1" dirty="0"/>
+              <a:t>Responsiveness</a:t>
+            </a:r>
+            <a:r>
+              <a:rPr lang="en-US" dirty="0"/>
+              <a:t> Cloud-Smartphone interaction: how fast the smartphone receives the advice on where to go, does it depend from the number of connected devices?</a:t>
+            </a:r>
+          </a:p>
+          <a:p>
+            <a:pPr lvl="1">
+              <a:buFont typeface="Arial" panose="020B0604020202020204" pitchFamily="34" charset="0"/>
+              <a:buChar char="•"/>
+            </a:pPr>
+            <a:endParaRPr lang="it-IT" dirty="0"/>
+          </a:p>
+        </p:txBody>
+      </p:sp>
+    </p:spTree>
+    <p:extLst>
+      <p:ext uri="{BB962C8B-B14F-4D97-AF65-F5344CB8AC3E}">
+        <p14:creationId xmlns:p14="http://schemas.microsoft.com/office/powerpoint/2010/main" val="3231330441"/>
+      </p:ext>
+    </p:extLst>
+  </p:cSld>
+  <p:clrMapOvr>
+    <a:masterClrMapping/>
+  </p:clrMapOvr>
+</p:sld>
+</file>
+
+<file path=ppt/slides/slide25.xml><?xml version="1.0" encoding="utf-8"?>
 <p:sld xmlns:a="http://schemas.openxmlformats.org/drawingml/2006/main" xmlns:r="http://schemas.openxmlformats.org/officeDocument/2006/relationships" xmlns:p="http://schemas.openxmlformats.org/presentationml/2006/main">
   <p:cSld>
     <p:bg>
@@ -10655,7 +11121,10 @@
             </a:r>
           </a:p>
           <a:p>
-            <a:pPr lvl="1"/>
+            <a:pPr lvl="1">
+              <a:buFont typeface="Wingdings" panose="05000000000000000000" pitchFamily="2" charset="2"/>
+              <a:buChar char="§"/>
+            </a:pPr>
             <a:r>
               <a:rPr lang="en-US" dirty="0"/>
               <a:t>Suggest the most interesting section for the visitor and, at the same time, try to avoid the formation of gatherings</a:t>
@@ -10868,10 +11337,10 @@
       </p:sp>
       <p:pic>
         <p:nvPicPr>
-          <p:cNvPr id="5" name="Segnaposto contenuto 4" descr="Immagine che contiene testo&#10;&#10;Descrizione generata automaticamente">
+          <p:cNvPr id="10" name="Segnaposto contenuto 9">
             <a:extLst>
               <a:ext uri="{FF2B5EF4-FFF2-40B4-BE49-F238E27FC236}">
-                <a16:creationId xmlns:a16="http://schemas.microsoft.com/office/drawing/2014/main" id="{8FF937C9-C98F-462F-BF2E-90F80E84DC67}"/>
+                <a16:creationId xmlns:a16="http://schemas.microsoft.com/office/drawing/2014/main" id="{EF67B521-CD97-4D1E-ADFA-A9CA21993770}"/>
               </a:ext>
             </a:extLst>
           </p:cNvPr>
@@ -10883,22 +11352,19 @@
           </p:nvPr>
         </p:nvPicPr>
         <p:blipFill>
-          <a:blip r:embed="rId2">
-            <a:extLst>
-              <a:ext uri="{28A0092B-C50C-407E-A947-70E740481C1C}">
-                <a14:useLocalDpi xmlns:a14="http://schemas.microsoft.com/office/drawing/2010/main" val="0"/>
-              </a:ext>
-            </a:extLst>
-          </a:blip>
+          <a:blip r:embed="rId2"/>
           <a:stretch>
             <a:fillRect/>
           </a:stretch>
         </p:blipFill>
         <p:spPr>
           <a:xfrm>
-            <a:off x="1874520" y="1518446"/>
-            <a:ext cx="6582700" cy="4969984"/>
+            <a:off x="1399369" y="1270000"/>
+            <a:ext cx="7152597" cy="5377792"/>
           </a:xfrm>
+          <a:prstGeom prst="rect">
+            <a:avLst/>
+          </a:prstGeom>
         </p:spPr>
       </p:pic>
     </p:spTree>

</xml_diff>